<commit_message>
-m Copy to usb
</commit_message>
<xml_diff>
--- a/Visionneuse/images/Header.pptx
+++ b/Visionneuse/images/Header.pptx
@@ -11,6 +11,7 @@
     <p:sldId id="259" r:id="rId5"/>
     <p:sldId id="260" r:id="rId6"/>
     <p:sldId id="261" r:id="rId7"/>
+    <p:sldId id="262" r:id="rId8"/>
   </p:sldIdLst>
   <p:sldSz cx="12192000" cy="6858000"/>
   <p:notesSz cx="6858000" cy="9144000"/>
@@ -246,7 +247,7 @@
           <a:p>
             <a:fld id="{27875E62-1D45-4935-A64B-EA891B8E2C1E}" type="datetimeFigureOut">
               <a:rPr lang="fr-FR" smtClean="0"/>
-              <a:t>27/07/2019</a:t>
+              <a:t>19/10/2019</a:t>
             </a:fld>
             <a:endParaRPr lang="fr-FR"/>
           </a:p>
@@ -288,7 +289,7 @@
           <a:p>
             <a:fld id="{EEB32DB8-07DD-48BC-A711-B55682B5D8F5}" type="slidenum">
               <a:rPr lang="fr-FR" smtClean="0"/>
-              <a:t>‹N°›</a:t>
+              <a:t>‹#›</a:t>
             </a:fld>
             <a:endParaRPr lang="fr-FR"/>
           </a:p>
@@ -414,7 +415,7 @@
           <a:p>
             <a:fld id="{27875E62-1D45-4935-A64B-EA891B8E2C1E}" type="datetimeFigureOut">
               <a:rPr lang="fr-FR" smtClean="0"/>
-              <a:t>27/07/2019</a:t>
+              <a:t>19/10/2019</a:t>
             </a:fld>
             <a:endParaRPr lang="fr-FR"/>
           </a:p>
@@ -456,7 +457,7 @@
           <a:p>
             <a:fld id="{EEB32DB8-07DD-48BC-A711-B55682B5D8F5}" type="slidenum">
               <a:rPr lang="fr-FR" smtClean="0"/>
-              <a:t>‹N°›</a:t>
+              <a:t>‹#›</a:t>
             </a:fld>
             <a:endParaRPr lang="fr-FR"/>
           </a:p>
@@ -592,7 +593,7 @@
           <a:p>
             <a:fld id="{27875E62-1D45-4935-A64B-EA891B8E2C1E}" type="datetimeFigureOut">
               <a:rPr lang="fr-FR" smtClean="0"/>
-              <a:t>27/07/2019</a:t>
+              <a:t>19/10/2019</a:t>
             </a:fld>
             <a:endParaRPr lang="fr-FR"/>
           </a:p>
@@ -634,7 +635,7 @@
           <a:p>
             <a:fld id="{EEB32DB8-07DD-48BC-A711-B55682B5D8F5}" type="slidenum">
               <a:rPr lang="fr-FR" smtClean="0"/>
-              <a:t>‹N°›</a:t>
+              <a:t>‹#›</a:t>
             </a:fld>
             <a:endParaRPr lang="fr-FR"/>
           </a:p>
@@ -760,7 +761,7 @@
           <a:p>
             <a:fld id="{27875E62-1D45-4935-A64B-EA891B8E2C1E}" type="datetimeFigureOut">
               <a:rPr lang="fr-FR" smtClean="0"/>
-              <a:t>27/07/2019</a:t>
+              <a:t>19/10/2019</a:t>
             </a:fld>
             <a:endParaRPr lang="fr-FR"/>
           </a:p>
@@ -802,7 +803,7 @@
           <a:p>
             <a:fld id="{EEB32DB8-07DD-48BC-A711-B55682B5D8F5}" type="slidenum">
               <a:rPr lang="fr-FR" smtClean="0"/>
-              <a:t>‹N°›</a:t>
+              <a:t>‹#›</a:t>
             </a:fld>
             <a:endParaRPr lang="fr-FR"/>
           </a:p>
@@ -1005,7 +1006,7 @@
           <a:p>
             <a:fld id="{27875E62-1D45-4935-A64B-EA891B8E2C1E}" type="datetimeFigureOut">
               <a:rPr lang="fr-FR" smtClean="0"/>
-              <a:t>27/07/2019</a:t>
+              <a:t>19/10/2019</a:t>
             </a:fld>
             <a:endParaRPr lang="fr-FR"/>
           </a:p>
@@ -1047,7 +1048,7 @@
           <a:p>
             <a:fld id="{EEB32DB8-07DD-48BC-A711-B55682B5D8F5}" type="slidenum">
               <a:rPr lang="fr-FR" smtClean="0"/>
-              <a:t>‹N°›</a:t>
+              <a:t>‹#›</a:t>
             </a:fld>
             <a:endParaRPr lang="fr-FR"/>
           </a:p>
@@ -1234,7 +1235,7 @@
           <a:p>
             <a:fld id="{27875E62-1D45-4935-A64B-EA891B8E2C1E}" type="datetimeFigureOut">
               <a:rPr lang="fr-FR" smtClean="0"/>
-              <a:t>27/07/2019</a:t>
+              <a:t>19/10/2019</a:t>
             </a:fld>
             <a:endParaRPr lang="fr-FR"/>
           </a:p>
@@ -1276,7 +1277,7 @@
           <a:p>
             <a:fld id="{EEB32DB8-07DD-48BC-A711-B55682B5D8F5}" type="slidenum">
               <a:rPr lang="fr-FR" smtClean="0"/>
-              <a:t>‹N°›</a:t>
+              <a:t>‹#›</a:t>
             </a:fld>
             <a:endParaRPr lang="fr-FR"/>
           </a:p>
@@ -1598,7 +1599,7 @@
           <a:p>
             <a:fld id="{27875E62-1D45-4935-A64B-EA891B8E2C1E}" type="datetimeFigureOut">
               <a:rPr lang="fr-FR" smtClean="0"/>
-              <a:t>27/07/2019</a:t>
+              <a:t>19/10/2019</a:t>
             </a:fld>
             <a:endParaRPr lang="fr-FR"/>
           </a:p>
@@ -1640,7 +1641,7 @@
           <a:p>
             <a:fld id="{EEB32DB8-07DD-48BC-A711-B55682B5D8F5}" type="slidenum">
               <a:rPr lang="fr-FR" smtClean="0"/>
-              <a:t>‹N°›</a:t>
+              <a:t>‹#›</a:t>
             </a:fld>
             <a:endParaRPr lang="fr-FR"/>
           </a:p>
@@ -1715,7 +1716,7 @@
           <a:p>
             <a:fld id="{27875E62-1D45-4935-A64B-EA891B8E2C1E}" type="datetimeFigureOut">
               <a:rPr lang="fr-FR" smtClean="0"/>
-              <a:t>27/07/2019</a:t>
+              <a:t>19/10/2019</a:t>
             </a:fld>
             <a:endParaRPr lang="fr-FR"/>
           </a:p>
@@ -1757,7 +1758,7 @@
           <a:p>
             <a:fld id="{EEB32DB8-07DD-48BC-A711-B55682B5D8F5}" type="slidenum">
               <a:rPr lang="fr-FR" smtClean="0"/>
-              <a:t>‹N°›</a:t>
+              <a:t>‹#›</a:t>
             </a:fld>
             <a:endParaRPr lang="fr-FR"/>
           </a:p>
@@ -1810,7 +1811,7 @@
           <a:p>
             <a:fld id="{27875E62-1D45-4935-A64B-EA891B8E2C1E}" type="datetimeFigureOut">
               <a:rPr lang="fr-FR" smtClean="0"/>
-              <a:t>27/07/2019</a:t>
+              <a:t>19/10/2019</a:t>
             </a:fld>
             <a:endParaRPr lang="fr-FR"/>
           </a:p>
@@ -1852,7 +1853,7 @@
           <a:p>
             <a:fld id="{EEB32DB8-07DD-48BC-A711-B55682B5D8F5}" type="slidenum">
               <a:rPr lang="fr-FR" smtClean="0"/>
-              <a:t>‹N°›</a:t>
+              <a:t>‹#›</a:t>
             </a:fld>
             <a:endParaRPr lang="fr-FR"/>
           </a:p>
@@ -2085,7 +2086,7 @@
           <a:p>
             <a:fld id="{27875E62-1D45-4935-A64B-EA891B8E2C1E}" type="datetimeFigureOut">
               <a:rPr lang="fr-FR" smtClean="0"/>
-              <a:t>27/07/2019</a:t>
+              <a:t>19/10/2019</a:t>
             </a:fld>
             <a:endParaRPr lang="fr-FR"/>
           </a:p>
@@ -2127,7 +2128,7 @@
           <a:p>
             <a:fld id="{EEB32DB8-07DD-48BC-A711-B55682B5D8F5}" type="slidenum">
               <a:rPr lang="fr-FR" smtClean="0"/>
-              <a:t>‹N°›</a:t>
+              <a:t>‹#›</a:t>
             </a:fld>
             <a:endParaRPr lang="fr-FR"/>
           </a:p>
@@ -2337,7 +2338,7 @@
           <a:p>
             <a:fld id="{27875E62-1D45-4935-A64B-EA891B8E2C1E}" type="datetimeFigureOut">
               <a:rPr lang="fr-FR" smtClean="0"/>
-              <a:t>27/07/2019</a:t>
+              <a:t>19/10/2019</a:t>
             </a:fld>
             <a:endParaRPr lang="fr-FR"/>
           </a:p>
@@ -2379,7 +2380,7 @@
           <a:p>
             <a:fld id="{EEB32DB8-07DD-48BC-A711-B55682B5D8F5}" type="slidenum">
               <a:rPr lang="fr-FR" smtClean="0"/>
-              <a:t>‹N°›</a:t>
+              <a:t>‹#›</a:t>
             </a:fld>
             <a:endParaRPr lang="fr-FR"/>
           </a:p>
@@ -2548,7 +2549,7 @@
           <a:p>
             <a:fld id="{27875E62-1D45-4935-A64B-EA891B8E2C1E}" type="datetimeFigureOut">
               <a:rPr lang="fr-FR" smtClean="0"/>
-              <a:t>27/07/2019</a:t>
+              <a:t>19/10/2019</a:t>
             </a:fld>
             <a:endParaRPr lang="fr-FR"/>
           </a:p>
@@ -2626,7 +2627,7 @@
           <a:p>
             <a:fld id="{EEB32DB8-07DD-48BC-A711-B55682B5D8F5}" type="slidenum">
               <a:rPr lang="fr-FR" smtClean="0"/>
-              <a:t>‹N°›</a:t>
+              <a:t>‹#›</a:t>
             </a:fld>
             <a:endParaRPr lang="fr-FR"/>
           </a:p>
@@ -4334,6 +4335,112 @@
 </p:sld>
 </file>
 
+<file path=ppt/slides/slide7.xml><?xml version="1.0" encoding="utf-8"?>
+<p:sld xmlns:a="http://schemas.openxmlformats.org/drawingml/2006/main" xmlns:r="http://schemas.openxmlformats.org/officeDocument/2006/relationships" xmlns:p="http://schemas.openxmlformats.org/presentationml/2006/main">
+  <p:cSld>
+    <p:spTree>
+      <p:nvGrpSpPr>
+        <p:cNvPr id="1" name=""/>
+        <p:cNvGrpSpPr/>
+        <p:nvPr/>
+      </p:nvGrpSpPr>
+      <p:grpSpPr>
+        <a:xfrm>
+          <a:off x="0" y="0"/>
+          <a:ext cx="0" cy="0"/>
+          <a:chOff x="0" y="0"/>
+          <a:chExt cx="0" cy="0"/>
+        </a:xfrm>
+      </p:grpSpPr>
+      <p:sp>
+        <p:nvSpPr>
+          <p:cNvPr id="4" name="Rectangle 3"/>
+          <p:cNvSpPr/>
+          <p:nvPr/>
+        </p:nvSpPr>
+        <p:spPr>
+          <a:xfrm>
+            <a:off x="0" y="0"/>
+            <a:ext cx="12192000" cy="6858000"/>
+          </a:xfrm>
+          <a:prstGeom prst="rect">
+            <a:avLst/>
+          </a:prstGeom>
+        </p:spPr>
+        <p:style>
+          <a:lnRef idx="2">
+            <a:schemeClr val="dk1">
+              <a:shade val="50000"/>
+            </a:schemeClr>
+          </a:lnRef>
+          <a:fillRef idx="1">
+            <a:schemeClr val="dk1"/>
+          </a:fillRef>
+          <a:effectRef idx="0">
+            <a:schemeClr val="dk1"/>
+          </a:effectRef>
+          <a:fontRef idx="minor">
+            <a:schemeClr val="lt1"/>
+          </a:fontRef>
+        </p:style>
+        <p:txBody>
+          <a:bodyPr rtlCol="0" anchor="ctr"/>
+          <a:lstStyle/>
+          <a:p>
+            <a:pPr algn="ctr"/>
+            <a:endParaRPr lang="fr-FR"/>
+          </a:p>
+        </p:txBody>
+      </p:sp>
+      <p:pic>
+        <p:nvPicPr>
+          <p:cNvPr id="3" name="Picture 2" descr="A close up of a logo&#10;&#10;Description automatically generated">
+            <a:extLst>
+              <a:ext uri="{FF2B5EF4-FFF2-40B4-BE49-F238E27FC236}">
+                <a16:creationId xmlns:a16="http://schemas.microsoft.com/office/drawing/2014/main" id="{D8C11852-8738-D141-BDEA-107481D4E033}"/>
+              </a:ext>
+            </a:extLst>
+          </p:cNvPr>
+          <p:cNvPicPr>
+            <a:picLocks noChangeAspect="1"/>
+          </p:cNvPicPr>
+          <p:nvPr/>
+        </p:nvPicPr>
+        <p:blipFill>
+          <a:blip r:embed="rId2">
+            <a:extLst>
+              <a:ext uri="{28A0092B-C50C-407E-A947-70E740481C1C}">
+                <a14:useLocalDpi xmlns:a14="http://schemas.microsoft.com/office/drawing/2010/main" val="0"/>
+              </a:ext>
+            </a:extLst>
+          </a:blip>
+          <a:stretch>
+            <a:fillRect/>
+          </a:stretch>
+        </p:blipFill>
+        <p:spPr>
+          <a:xfrm>
+            <a:off x="3836284" y="661409"/>
+            <a:ext cx="4541126" cy="5556201"/>
+          </a:xfrm>
+          <a:prstGeom prst="rect">
+            <a:avLst/>
+          </a:prstGeom>
+        </p:spPr>
+      </p:pic>
+    </p:spTree>
+    <p:extLst>
+      <p:ext uri="{BB962C8B-B14F-4D97-AF65-F5344CB8AC3E}">
+        <p14:creationId xmlns:p14="http://schemas.microsoft.com/office/powerpoint/2010/main" val="2169350774"/>
+      </p:ext>
+    </p:extLst>
+  </p:cSld>
+  <p:clrMapOvr>
+    <a:masterClrMapping/>
+  </p:clrMapOvr>
+</p:sld>
+</file>
+
 <file path=ppt/theme/theme1.xml><?xml version="1.0" encoding="utf-8"?>
 <a:theme xmlns:a="http://schemas.openxmlformats.org/drawingml/2006/main" name="Thème Office">
   <a:themeElements>

</xml_diff>